<commit_message>
some work on Intro and grouping; responsesJuly2019.tex updated
</commit_message>
<xml_diff>
--- a/FGCS-2019/reworked-fig7.pptx
+++ b/FGCS-2019/reworked-fig7.pptx
@@ -304,7 +304,7 @@
           <a:p>
             <a:fld id="{2DE544F1-4EB3-B943-BAC8-4587CDEC2BDB}" type="datetimeFigureOut">
               <a:rPr lang="en-US" smtClean="0"/>
-              <a:t>9/9/19</a:t>
+              <a:t>9/27/19</a:t>
             </a:fld>
             <a:endParaRPr lang="en-US"/>
           </a:p>
@@ -502,7 +502,7 @@
           <a:p>
             <a:fld id="{2DE544F1-4EB3-B943-BAC8-4587CDEC2BDB}" type="datetimeFigureOut">
               <a:rPr lang="en-US" smtClean="0"/>
-              <a:t>9/9/19</a:t>
+              <a:t>9/27/19</a:t>
             </a:fld>
             <a:endParaRPr lang="en-US"/>
           </a:p>
@@ -710,7 +710,7 @@
           <a:p>
             <a:fld id="{2DE544F1-4EB3-B943-BAC8-4587CDEC2BDB}" type="datetimeFigureOut">
               <a:rPr lang="en-US" smtClean="0"/>
-              <a:t>9/9/19</a:t>
+              <a:t>9/27/19</a:t>
             </a:fld>
             <a:endParaRPr lang="en-US"/>
           </a:p>
@@ -908,7 +908,7 @@
           <a:p>
             <a:fld id="{2DE544F1-4EB3-B943-BAC8-4587CDEC2BDB}" type="datetimeFigureOut">
               <a:rPr lang="en-US" smtClean="0"/>
-              <a:t>9/9/19</a:t>
+              <a:t>9/27/19</a:t>
             </a:fld>
             <a:endParaRPr lang="en-US"/>
           </a:p>
@@ -1183,7 +1183,7 @@
           <a:p>
             <a:fld id="{2DE544F1-4EB3-B943-BAC8-4587CDEC2BDB}" type="datetimeFigureOut">
               <a:rPr lang="en-US" smtClean="0"/>
-              <a:t>9/9/19</a:t>
+              <a:t>9/27/19</a:t>
             </a:fld>
             <a:endParaRPr lang="en-US"/>
           </a:p>
@@ -1448,7 +1448,7 @@
           <a:p>
             <a:fld id="{2DE544F1-4EB3-B943-BAC8-4587CDEC2BDB}" type="datetimeFigureOut">
               <a:rPr lang="en-US" smtClean="0"/>
-              <a:t>9/9/19</a:t>
+              <a:t>9/27/19</a:t>
             </a:fld>
             <a:endParaRPr lang="en-US"/>
           </a:p>
@@ -1860,7 +1860,7 @@
           <a:p>
             <a:fld id="{2DE544F1-4EB3-B943-BAC8-4587CDEC2BDB}" type="datetimeFigureOut">
               <a:rPr lang="en-US" smtClean="0"/>
-              <a:t>9/9/19</a:t>
+              <a:t>9/27/19</a:t>
             </a:fld>
             <a:endParaRPr lang="en-US"/>
           </a:p>
@@ -2001,7 +2001,7 @@
           <a:p>
             <a:fld id="{2DE544F1-4EB3-B943-BAC8-4587CDEC2BDB}" type="datetimeFigureOut">
               <a:rPr lang="en-US" smtClean="0"/>
-              <a:t>9/9/19</a:t>
+              <a:t>9/27/19</a:t>
             </a:fld>
             <a:endParaRPr lang="en-US"/>
           </a:p>
@@ -2114,7 +2114,7 @@
           <a:p>
             <a:fld id="{2DE544F1-4EB3-B943-BAC8-4587CDEC2BDB}" type="datetimeFigureOut">
               <a:rPr lang="en-US" smtClean="0"/>
-              <a:t>9/9/19</a:t>
+              <a:t>9/27/19</a:t>
             </a:fld>
             <a:endParaRPr lang="en-US"/>
           </a:p>
@@ -2425,7 +2425,7 @@
           <a:p>
             <a:fld id="{2DE544F1-4EB3-B943-BAC8-4587CDEC2BDB}" type="datetimeFigureOut">
               <a:rPr lang="en-US" smtClean="0"/>
-              <a:t>9/9/19</a:t>
+              <a:t>9/27/19</a:t>
             </a:fld>
             <a:endParaRPr lang="en-US"/>
           </a:p>
@@ -2713,7 +2713,7 @@
           <a:p>
             <a:fld id="{2DE544F1-4EB3-B943-BAC8-4587CDEC2BDB}" type="datetimeFigureOut">
               <a:rPr lang="en-US" smtClean="0"/>
-              <a:t>9/9/19</a:t>
+              <a:t>9/27/19</a:t>
             </a:fld>
             <a:endParaRPr lang="en-US"/>
           </a:p>
@@ -2954,7 +2954,7 @@
           <a:p>
             <a:fld id="{2DE544F1-4EB3-B943-BAC8-4587CDEC2BDB}" type="datetimeFigureOut">
               <a:rPr lang="en-US" smtClean="0"/>
-              <a:t>9/9/19</a:t>
+              <a:t>9/27/19</a:t>
             </a:fld>
             <a:endParaRPr lang="en-US"/>
           </a:p>
@@ -10687,7 +10687,7 @@
         </p:nvGrpSpPr>
         <p:grpSpPr>
           <a:xfrm>
-            <a:off x="471760" y="3709739"/>
+            <a:off x="466872" y="3751439"/>
             <a:ext cx="370458" cy="394531"/>
             <a:chOff x="2651620" y="4455131"/>
             <a:chExt cx="370458" cy="394531"/>
@@ -10809,9 +10809,9 @@
           <p:nvPr/>
         </p:nvCxnSpPr>
         <p:spPr>
-          <a:xfrm flipH="1" flipV="1">
-            <a:off x="842218" y="3907005"/>
-            <a:ext cx="1520431" cy="28737"/>
+          <a:xfrm flipH="1">
+            <a:off x="837330" y="3935742"/>
+            <a:ext cx="1525315" cy="12963"/>
           </a:xfrm>
           <a:prstGeom prst="straightConnector1">
             <a:avLst/>
@@ -11141,6 +11141,588 @@
               </a:rPr>
               <a:t>replace()</a:t>
             </a:r>
+          </a:p>
+        </p:txBody>
+      </p:sp>
+      <p:sp>
+        <p:nvSpPr>
+          <p:cNvPr id="274" name="TextBox 273">
+            <a:extLst>
+              <a:ext uri="{FF2B5EF4-FFF2-40B4-BE49-F238E27FC236}">
+                <a16:creationId xmlns:a16="http://schemas.microsoft.com/office/drawing/2014/main" id="{CBC847F5-09A6-3948-ACA1-B7135ACFAC50}"/>
+              </a:ext>
+            </a:extLst>
+          </p:cNvPr>
+          <p:cNvSpPr txBox="1"/>
+          <p:nvPr/>
+        </p:nvSpPr>
+        <p:spPr>
+          <a:xfrm>
+            <a:off x="847593" y="1096378"/>
+            <a:ext cx="510333" cy="276999"/>
+          </a:xfrm>
+          <a:prstGeom prst="rect">
+            <a:avLst/>
+          </a:prstGeom>
+          <a:noFill/>
+        </p:spPr>
+        <p:txBody>
+          <a:bodyPr wrap="none" rtlCol="0">
+            <a:spAutoFit/>
+          </a:bodyPr>
+          <a:lstStyle/>
+          <a:p>
+            <a:r>
+              <a:rPr lang="en-US" sz="1200" dirty="0" err="1">
+                <a:latin typeface="+mj-lt"/>
+                <a:cs typeface="Times New Roman" panose="02020603050405020304" pitchFamily="18" charset="0"/>
+              </a:rPr>
+              <a:t>wgBy</a:t>
+            </a:r>
+            <a:endParaRPr lang="en-US" sz="1200" dirty="0">
+              <a:latin typeface="+mj-lt"/>
+              <a:cs typeface="Times New Roman" panose="02020603050405020304" pitchFamily="18" charset="0"/>
+            </a:endParaRPr>
+          </a:p>
+        </p:txBody>
+      </p:sp>
+      <p:sp>
+        <p:nvSpPr>
+          <p:cNvPr id="277" name="TextBox 276">
+            <a:extLst>
+              <a:ext uri="{FF2B5EF4-FFF2-40B4-BE49-F238E27FC236}">
+                <a16:creationId xmlns:a16="http://schemas.microsoft.com/office/drawing/2014/main" id="{B115F89B-D8F1-EC42-8A9E-7ACC1C539808}"/>
+              </a:ext>
+            </a:extLst>
+          </p:cNvPr>
+          <p:cNvSpPr txBox="1"/>
+          <p:nvPr/>
+        </p:nvSpPr>
+        <p:spPr>
+          <a:xfrm>
+            <a:off x="1794365" y="2245440"/>
+            <a:ext cx="482824" cy="276999"/>
+          </a:xfrm>
+          <a:prstGeom prst="rect">
+            <a:avLst/>
+          </a:prstGeom>
+          <a:noFill/>
+        </p:spPr>
+        <p:txBody>
+          <a:bodyPr wrap="none" rtlCol="0">
+            <a:spAutoFit/>
+          </a:bodyPr>
+          <a:lstStyle/>
+          <a:p>
+            <a:r>
+              <a:rPr lang="en-US" sz="1200" dirty="0">
+                <a:latin typeface="+mj-lt"/>
+                <a:cs typeface="Times New Roman" panose="02020603050405020304" pitchFamily="18" charset="0"/>
+              </a:rPr>
+              <a:t>used</a:t>
+            </a:r>
+          </a:p>
+        </p:txBody>
+      </p:sp>
+      <p:sp>
+        <p:nvSpPr>
+          <p:cNvPr id="281" name="TextBox 280">
+            <a:extLst>
+              <a:ext uri="{FF2B5EF4-FFF2-40B4-BE49-F238E27FC236}">
+                <a16:creationId xmlns:a16="http://schemas.microsoft.com/office/drawing/2014/main" id="{3C5684F4-3A20-A247-8036-3890DD8F32FF}"/>
+              </a:ext>
+            </a:extLst>
+          </p:cNvPr>
+          <p:cNvSpPr txBox="1"/>
+          <p:nvPr/>
+        </p:nvSpPr>
+        <p:spPr>
+          <a:xfrm>
+            <a:off x="1895314" y="1380858"/>
+            <a:ext cx="482824" cy="276999"/>
+          </a:xfrm>
+          <a:prstGeom prst="rect">
+            <a:avLst/>
+          </a:prstGeom>
+          <a:noFill/>
+        </p:spPr>
+        <p:txBody>
+          <a:bodyPr wrap="none" rtlCol="0">
+            <a:spAutoFit/>
+          </a:bodyPr>
+          <a:lstStyle/>
+          <a:p>
+            <a:r>
+              <a:rPr lang="en-US" sz="1200" dirty="0">
+                <a:latin typeface="+mj-lt"/>
+                <a:cs typeface="Times New Roman" panose="02020603050405020304" pitchFamily="18" charset="0"/>
+              </a:rPr>
+              <a:t>used</a:t>
+            </a:r>
+          </a:p>
+        </p:txBody>
+      </p:sp>
+      <p:sp>
+        <p:nvSpPr>
+          <p:cNvPr id="283" name="TextBox 282">
+            <a:extLst>
+              <a:ext uri="{FF2B5EF4-FFF2-40B4-BE49-F238E27FC236}">
+                <a16:creationId xmlns:a16="http://schemas.microsoft.com/office/drawing/2014/main" id="{3C4A0920-BFBC-B84E-820D-1B16B3B4900F}"/>
+              </a:ext>
+            </a:extLst>
+          </p:cNvPr>
+          <p:cNvSpPr txBox="1"/>
+          <p:nvPr/>
+        </p:nvSpPr>
+        <p:spPr>
+          <a:xfrm>
+            <a:off x="1747182" y="580338"/>
+            <a:ext cx="482824" cy="276999"/>
+          </a:xfrm>
+          <a:prstGeom prst="rect">
+            <a:avLst/>
+          </a:prstGeom>
+          <a:noFill/>
+        </p:spPr>
+        <p:txBody>
+          <a:bodyPr wrap="none" rtlCol="0">
+            <a:spAutoFit/>
+          </a:bodyPr>
+          <a:lstStyle/>
+          <a:p>
+            <a:r>
+              <a:rPr lang="en-US" sz="1200" dirty="0">
+                <a:latin typeface="+mj-lt"/>
+                <a:cs typeface="Times New Roman" panose="02020603050405020304" pitchFamily="18" charset="0"/>
+              </a:rPr>
+              <a:t>used</a:t>
+            </a:r>
+          </a:p>
+        </p:txBody>
+      </p:sp>
+      <p:sp>
+        <p:nvSpPr>
+          <p:cNvPr id="284" name="TextBox 283">
+            <a:extLst>
+              <a:ext uri="{FF2B5EF4-FFF2-40B4-BE49-F238E27FC236}">
+                <a16:creationId xmlns:a16="http://schemas.microsoft.com/office/drawing/2014/main" id="{3B60A1D9-63DF-454C-AD59-28085F16ADD2}"/>
+              </a:ext>
+            </a:extLst>
+          </p:cNvPr>
+          <p:cNvSpPr txBox="1"/>
+          <p:nvPr/>
+        </p:nvSpPr>
+        <p:spPr>
+          <a:xfrm>
+            <a:off x="7353139" y="2222175"/>
+            <a:ext cx="482824" cy="276999"/>
+          </a:xfrm>
+          <a:prstGeom prst="rect">
+            <a:avLst/>
+          </a:prstGeom>
+          <a:noFill/>
+        </p:spPr>
+        <p:txBody>
+          <a:bodyPr wrap="none" rtlCol="0">
+            <a:spAutoFit/>
+          </a:bodyPr>
+          <a:lstStyle/>
+          <a:p>
+            <a:r>
+              <a:rPr lang="en-US" sz="1200" dirty="0">
+                <a:latin typeface="+mj-lt"/>
+                <a:cs typeface="Times New Roman" panose="02020603050405020304" pitchFamily="18" charset="0"/>
+              </a:rPr>
+              <a:t>used</a:t>
+            </a:r>
+          </a:p>
+        </p:txBody>
+      </p:sp>
+      <p:sp>
+        <p:nvSpPr>
+          <p:cNvPr id="286" name="TextBox 285">
+            <a:extLst>
+              <a:ext uri="{FF2B5EF4-FFF2-40B4-BE49-F238E27FC236}">
+                <a16:creationId xmlns:a16="http://schemas.microsoft.com/office/drawing/2014/main" id="{F01CE5A6-37F4-744E-9911-84A8A967BD2B}"/>
+              </a:ext>
+            </a:extLst>
+          </p:cNvPr>
+          <p:cNvSpPr txBox="1"/>
+          <p:nvPr/>
+        </p:nvSpPr>
+        <p:spPr>
+          <a:xfrm>
+            <a:off x="7408513" y="1386041"/>
+            <a:ext cx="482824" cy="276999"/>
+          </a:xfrm>
+          <a:prstGeom prst="rect">
+            <a:avLst/>
+          </a:prstGeom>
+          <a:noFill/>
+        </p:spPr>
+        <p:txBody>
+          <a:bodyPr wrap="none" rtlCol="0">
+            <a:spAutoFit/>
+          </a:bodyPr>
+          <a:lstStyle/>
+          <a:p>
+            <a:r>
+              <a:rPr lang="en-US" sz="1200" dirty="0">
+                <a:latin typeface="+mj-lt"/>
+                <a:cs typeface="Times New Roman" panose="02020603050405020304" pitchFamily="18" charset="0"/>
+              </a:rPr>
+              <a:t>used</a:t>
+            </a:r>
+          </a:p>
+        </p:txBody>
+      </p:sp>
+      <p:sp>
+        <p:nvSpPr>
+          <p:cNvPr id="287" name="TextBox 286">
+            <a:extLst>
+              <a:ext uri="{FF2B5EF4-FFF2-40B4-BE49-F238E27FC236}">
+                <a16:creationId xmlns:a16="http://schemas.microsoft.com/office/drawing/2014/main" id="{28438A40-C5C1-A749-8C59-14AA12131B7A}"/>
+              </a:ext>
+            </a:extLst>
+          </p:cNvPr>
+          <p:cNvSpPr txBox="1"/>
+          <p:nvPr/>
+        </p:nvSpPr>
+        <p:spPr>
+          <a:xfrm>
+            <a:off x="7307361" y="646469"/>
+            <a:ext cx="482824" cy="276999"/>
+          </a:xfrm>
+          <a:prstGeom prst="rect">
+            <a:avLst/>
+          </a:prstGeom>
+          <a:noFill/>
+        </p:spPr>
+        <p:txBody>
+          <a:bodyPr wrap="none" rtlCol="0">
+            <a:spAutoFit/>
+          </a:bodyPr>
+          <a:lstStyle/>
+          <a:p>
+            <a:r>
+              <a:rPr lang="en-US" sz="1200" dirty="0">
+                <a:latin typeface="+mj-lt"/>
+                <a:cs typeface="Times New Roman" panose="02020603050405020304" pitchFamily="18" charset="0"/>
+              </a:rPr>
+              <a:t>used</a:t>
+            </a:r>
+          </a:p>
+        </p:txBody>
+      </p:sp>
+      <p:sp>
+        <p:nvSpPr>
+          <p:cNvPr id="288" name="TextBox 287">
+            <a:extLst>
+              <a:ext uri="{FF2B5EF4-FFF2-40B4-BE49-F238E27FC236}">
+                <a16:creationId xmlns:a16="http://schemas.microsoft.com/office/drawing/2014/main" id="{2C8D9252-5BE1-BC45-B1F1-8F216A5D7888}"/>
+              </a:ext>
+            </a:extLst>
+          </p:cNvPr>
+          <p:cNvSpPr txBox="1"/>
+          <p:nvPr/>
+        </p:nvSpPr>
+        <p:spPr>
+          <a:xfrm>
+            <a:off x="3518887" y="1249328"/>
+            <a:ext cx="482824" cy="276999"/>
+          </a:xfrm>
+          <a:prstGeom prst="rect">
+            <a:avLst/>
+          </a:prstGeom>
+          <a:noFill/>
+        </p:spPr>
+        <p:txBody>
+          <a:bodyPr wrap="none" rtlCol="0">
+            <a:spAutoFit/>
+          </a:bodyPr>
+          <a:lstStyle/>
+          <a:p>
+            <a:r>
+              <a:rPr lang="en-US" sz="1200" dirty="0">
+                <a:latin typeface="+mj-lt"/>
+                <a:cs typeface="Times New Roman" panose="02020603050405020304" pitchFamily="18" charset="0"/>
+              </a:rPr>
+              <a:t>used</a:t>
+            </a:r>
+          </a:p>
+        </p:txBody>
+      </p:sp>
+      <p:sp>
+        <p:nvSpPr>
+          <p:cNvPr id="289" name="TextBox 288">
+            <a:extLst>
+              <a:ext uri="{FF2B5EF4-FFF2-40B4-BE49-F238E27FC236}">
+                <a16:creationId xmlns:a16="http://schemas.microsoft.com/office/drawing/2014/main" id="{90E7FD73-63FF-564F-A463-5F059E02571F}"/>
+              </a:ext>
+            </a:extLst>
+          </p:cNvPr>
+          <p:cNvSpPr txBox="1"/>
+          <p:nvPr/>
+        </p:nvSpPr>
+        <p:spPr>
+          <a:xfrm>
+            <a:off x="8979011" y="1275604"/>
+            <a:ext cx="482824" cy="276999"/>
+          </a:xfrm>
+          <a:prstGeom prst="rect">
+            <a:avLst/>
+          </a:prstGeom>
+          <a:noFill/>
+        </p:spPr>
+        <p:txBody>
+          <a:bodyPr wrap="none" rtlCol="0">
+            <a:spAutoFit/>
+          </a:bodyPr>
+          <a:lstStyle/>
+          <a:p>
+            <a:r>
+              <a:rPr lang="en-US" sz="1200" dirty="0">
+                <a:latin typeface="+mj-lt"/>
+                <a:cs typeface="Times New Roman" panose="02020603050405020304" pitchFamily="18" charset="0"/>
+              </a:rPr>
+              <a:t>used</a:t>
+            </a:r>
+          </a:p>
+        </p:txBody>
+      </p:sp>
+      <p:sp>
+        <p:nvSpPr>
+          <p:cNvPr id="290" name="TextBox 289">
+            <a:extLst>
+              <a:ext uri="{FF2B5EF4-FFF2-40B4-BE49-F238E27FC236}">
+                <a16:creationId xmlns:a16="http://schemas.microsoft.com/office/drawing/2014/main" id="{18F3CCB9-6E91-8747-9D5E-981E18836FE9}"/>
+              </a:ext>
+            </a:extLst>
+          </p:cNvPr>
+          <p:cNvSpPr txBox="1"/>
+          <p:nvPr/>
+        </p:nvSpPr>
+        <p:spPr>
+          <a:xfrm>
+            <a:off x="8967964" y="3772236"/>
+            <a:ext cx="482824" cy="276999"/>
+          </a:xfrm>
+          <a:prstGeom prst="rect">
+            <a:avLst/>
+          </a:prstGeom>
+          <a:noFill/>
+        </p:spPr>
+        <p:txBody>
+          <a:bodyPr wrap="none" rtlCol="0">
+            <a:spAutoFit/>
+          </a:bodyPr>
+          <a:lstStyle/>
+          <a:p>
+            <a:r>
+              <a:rPr lang="en-US" sz="1200" dirty="0">
+                <a:latin typeface="+mj-lt"/>
+                <a:cs typeface="Times New Roman" panose="02020603050405020304" pitchFamily="18" charset="0"/>
+              </a:rPr>
+              <a:t>used</a:t>
+            </a:r>
+          </a:p>
+        </p:txBody>
+      </p:sp>
+      <p:sp>
+        <p:nvSpPr>
+          <p:cNvPr id="291" name="TextBox 290">
+            <a:extLst>
+              <a:ext uri="{FF2B5EF4-FFF2-40B4-BE49-F238E27FC236}">
+                <a16:creationId xmlns:a16="http://schemas.microsoft.com/office/drawing/2014/main" id="{9F902D63-E05F-E444-B789-E0A89BA49411}"/>
+              </a:ext>
+            </a:extLst>
+          </p:cNvPr>
+          <p:cNvSpPr txBox="1"/>
+          <p:nvPr/>
+        </p:nvSpPr>
+        <p:spPr>
+          <a:xfrm>
+            <a:off x="7231326" y="3140651"/>
+            <a:ext cx="482824" cy="276999"/>
+          </a:xfrm>
+          <a:prstGeom prst="rect">
+            <a:avLst/>
+          </a:prstGeom>
+          <a:noFill/>
+        </p:spPr>
+        <p:txBody>
+          <a:bodyPr wrap="none" rtlCol="0">
+            <a:spAutoFit/>
+          </a:bodyPr>
+          <a:lstStyle/>
+          <a:p>
+            <a:r>
+              <a:rPr lang="en-US" sz="1200" dirty="0">
+                <a:latin typeface="+mj-lt"/>
+                <a:cs typeface="Times New Roman" panose="02020603050405020304" pitchFamily="18" charset="0"/>
+              </a:rPr>
+              <a:t>used</a:t>
+            </a:r>
+          </a:p>
+        </p:txBody>
+      </p:sp>
+      <p:sp>
+        <p:nvSpPr>
+          <p:cNvPr id="292" name="TextBox 291">
+            <a:extLst>
+              <a:ext uri="{FF2B5EF4-FFF2-40B4-BE49-F238E27FC236}">
+                <a16:creationId xmlns:a16="http://schemas.microsoft.com/office/drawing/2014/main" id="{2B3788AC-45E1-7E4E-922F-719E6214EB6F}"/>
+              </a:ext>
+            </a:extLst>
+          </p:cNvPr>
+          <p:cNvSpPr txBox="1"/>
+          <p:nvPr/>
+        </p:nvSpPr>
+        <p:spPr>
+          <a:xfrm>
+            <a:off x="7207512" y="3794317"/>
+            <a:ext cx="482824" cy="276999"/>
+          </a:xfrm>
+          <a:prstGeom prst="rect">
+            <a:avLst/>
+          </a:prstGeom>
+          <a:noFill/>
+        </p:spPr>
+        <p:txBody>
+          <a:bodyPr wrap="none" rtlCol="0">
+            <a:spAutoFit/>
+          </a:bodyPr>
+          <a:lstStyle/>
+          <a:p>
+            <a:r>
+              <a:rPr lang="en-US" sz="1200" dirty="0">
+                <a:latin typeface="+mj-lt"/>
+                <a:cs typeface="Times New Roman" panose="02020603050405020304" pitchFamily="18" charset="0"/>
+              </a:rPr>
+              <a:t>used</a:t>
+            </a:r>
+          </a:p>
+        </p:txBody>
+      </p:sp>
+      <p:sp>
+        <p:nvSpPr>
+          <p:cNvPr id="293" name="TextBox 292">
+            <a:extLst>
+              <a:ext uri="{FF2B5EF4-FFF2-40B4-BE49-F238E27FC236}">
+                <a16:creationId xmlns:a16="http://schemas.microsoft.com/office/drawing/2014/main" id="{190AC893-A7BC-9741-B488-209CB5002AF8}"/>
+              </a:ext>
+            </a:extLst>
+          </p:cNvPr>
+          <p:cNvSpPr txBox="1"/>
+          <p:nvPr/>
+        </p:nvSpPr>
+        <p:spPr>
+          <a:xfrm>
+            <a:off x="7314635" y="4684269"/>
+            <a:ext cx="482824" cy="276999"/>
+          </a:xfrm>
+          <a:prstGeom prst="rect">
+            <a:avLst/>
+          </a:prstGeom>
+          <a:noFill/>
+        </p:spPr>
+        <p:txBody>
+          <a:bodyPr wrap="none" rtlCol="0">
+            <a:spAutoFit/>
+          </a:bodyPr>
+          <a:lstStyle/>
+          <a:p>
+            <a:r>
+              <a:rPr lang="en-US" sz="1200" dirty="0">
+                <a:latin typeface="+mj-lt"/>
+                <a:cs typeface="Times New Roman" panose="02020603050405020304" pitchFamily="18" charset="0"/>
+              </a:rPr>
+              <a:t>used</a:t>
+            </a:r>
+          </a:p>
+        </p:txBody>
+      </p:sp>
+      <p:sp>
+        <p:nvSpPr>
+          <p:cNvPr id="294" name="TextBox 293">
+            <a:extLst>
+              <a:ext uri="{FF2B5EF4-FFF2-40B4-BE49-F238E27FC236}">
+                <a16:creationId xmlns:a16="http://schemas.microsoft.com/office/drawing/2014/main" id="{665EA50C-4F1A-1D49-9B5A-C6D3571D5665}"/>
+              </a:ext>
+            </a:extLst>
+          </p:cNvPr>
+          <p:cNvSpPr txBox="1"/>
+          <p:nvPr/>
+        </p:nvSpPr>
+        <p:spPr>
+          <a:xfrm>
+            <a:off x="6291889" y="3607574"/>
+            <a:ext cx="510333" cy="276999"/>
+          </a:xfrm>
+          <a:prstGeom prst="rect">
+            <a:avLst/>
+          </a:prstGeom>
+          <a:noFill/>
+        </p:spPr>
+        <p:txBody>
+          <a:bodyPr wrap="none" rtlCol="0">
+            <a:spAutoFit/>
+          </a:bodyPr>
+          <a:lstStyle/>
+          <a:p>
+            <a:r>
+              <a:rPr lang="en-US" sz="1200" dirty="0" err="1">
+                <a:latin typeface="+mj-lt"/>
+                <a:cs typeface="Times New Roman" panose="02020603050405020304" pitchFamily="18" charset="0"/>
+              </a:rPr>
+              <a:t>wgBy</a:t>
+            </a:r>
+            <a:endParaRPr lang="en-US" sz="1200" dirty="0">
+              <a:latin typeface="+mj-lt"/>
+              <a:cs typeface="Times New Roman" panose="02020603050405020304" pitchFamily="18" charset="0"/>
+            </a:endParaRPr>
+          </a:p>
+        </p:txBody>
+      </p:sp>
+      <p:sp>
+        <p:nvSpPr>
+          <p:cNvPr id="295" name="TextBox 294">
+            <a:extLst>
+              <a:ext uri="{FF2B5EF4-FFF2-40B4-BE49-F238E27FC236}">
+                <a16:creationId xmlns:a16="http://schemas.microsoft.com/office/drawing/2014/main" id="{9A91D90E-A071-184C-8EB8-54759DF91A90}"/>
+              </a:ext>
+            </a:extLst>
+          </p:cNvPr>
+          <p:cNvSpPr txBox="1"/>
+          <p:nvPr/>
+        </p:nvSpPr>
+        <p:spPr>
+          <a:xfrm>
+            <a:off x="6339465" y="1118760"/>
+            <a:ext cx="510333" cy="276999"/>
+          </a:xfrm>
+          <a:prstGeom prst="rect">
+            <a:avLst/>
+          </a:prstGeom>
+          <a:noFill/>
+        </p:spPr>
+        <p:txBody>
+          <a:bodyPr wrap="none" rtlCol="0">
+            <a:spAutoFit/>
+          </a:bodyPr>
+          <a:lstStyle/>
+          <a:p>
+            <a:r>
+              <a:rPr lang="en-US" sz="1200" dirty="0" err="1">
+                <a:latin typeface="+mj-lt"/>
+                <a:cs typeface="Times New Roman" panose="02020603050405020304" pitchFamily="18" charset="0"/>
+              </a:rPr>
+              <a:t>wgBy</a:t>
+            </a:r>
+            <a:endParaRPr lang="en-US" sz="1200" dirty="0">
+              <a:latin typeface="+mj-lt"/>
+              <a:cs typeface="Times New Roman" panose="02020603050405020304" pitchFamily="18" charset="0"/>
+            </a:endParaRPr>
           </a:p>
         </p:txBody>
       </p:sp>

</xml_diff>